<commit_message>
initial commit for site reorg
Signed-off-by: Srinivasan Parthasarathy <spartha@us.ibm.com>
</commit_message>
<xml_diff>
--- a/mkdocs/docs/images/src/ab.pptx
+++ b/mkdocs/docs/images/src/ab.pptx
@@ -197,7 +197,7 @@
           <a:p>
             <a:fld id="{38B78CBE-37FA-D241-BB4C-CAC5D3B25F49}" type="datetimeFigureOut">
               <a:rPr lang="en-US" smtClean="0"/>
-              <a:t>4/28/21</a:t>
+              <a:t>6/15/21</a:t>
             </a:fld>
             <a:endParaRPr lang="en-US"/>
           </a:p>
@@ -695,7 +695,7 @@
           <a:p>
             <a:fld id="{708812C5-0212-FD42-A0D4-E2E8FF4E3AF5}" type="datetime1">
               <a:rPr lang="en-US" smtClean="0"/>
-              <a:t>4/28/21</a:t>
+              <a:t>6/15/21</a:t>
             </a:fld>
             <a:endParaRPr lang="en-US"/>
           </a:p>
@@ -896,7 +896,7 @@
           <a:p>
             <a:fld id="{D232AC6F-41C3-B34B-9BAA-03ED2F3BC0F6}" type="datetime1">
               <a:rPr lang="en-US" smtClean="0"/>
-              <a:t>4/28/21</a:t>
+              <a:t>6/15/21</a:t>
             </a:fld>
             <a:endParaRPr lang="en-US"/>
           </a:p>
@@ -1107,7 +1107,7 @@
           <a:p>
             <a:fld id="{BEE140C2-F440-9D49-95CB-5965D64CC4A2}" type="datetime1">
               <a:rPr lang="en-US" smtClean="0"/>
-              <a:t>4/28/21</a:t>
+              <a:t>6/15/21</a:t>
             </a:fld>
             <a:endParaRPr lang="en-US"/>
           </a:p>
@@ -1308,7 +1308,7 @@
           <a:p>
             <a:fld id="{CC99F980-FB29-FD47-8508-150F73F1E8B0}" type="datetime1">
               <a:rPr lang="en-US" smtClean="0"/>
-              <a:t>4/28/21</a:t>
+              <a:t>6/15/21</a:t>
             </a:fld>
             <a:endParaRPr lang="en-US"/>
           </a:p>
@@ -1586,7 +1586,7 @@
           <a:p>
             <a:fld id="{D4510983-EA22-9643-8AC0-B3C6499B643B}" type="datetime1">
               <a:rPr lang="en-US" smtClean="0"/>
-              <a:t>4/28/21</a:t>
+              <a:t>6/15/21</a:t>
             </a:fld>
             <a:endParaRPr lang="en-US"/>
           </a:p>
@@ -1854,7 +1854,7 @@
           <a:p>
             <a:fld id="{D5A39195-967D-5D4E-8C6A-C99866996458}" type="datetime1">
               <a:rPr lang="en-US" smtClean="0"/>
-              <a:t>4/28/21</a:t>
+              <a:t>6/15/21</a:t>
             </a:fld>
             <a:endParaRPr lang="en-US"/>
           </a:p>
@@ -2269,7 +2269,7 @@
           <a:p>
             <a:fld id="{5AD771E9-C79D-684D-A158-5EB6E92DE947}" type="datetime1">
               <a:rPr lang="en-US" smtClean="0"/>
-              <a:t>4/28/21</a:t>
+              <a:t>6/15/21</a:t>
             </a:fld>
             <a:endParaRPr lang="en-US"/>
           </a:p>
@@ -2413,7 +2413,7 @@
           <a:p>
             <a:fld id="{693CA161-7E4C-5C4B-B799-DB602A0B9806}" type="datetime1">
               <a:rPr lang="en-US" smtClean="0"/>
-              <a:t>4/28/21</a:t>
+              <a:t>6/15/21</a:t>
             </a:fld>
             <a:endParaRPr lang="en-US"/>
           </a:p>
@@ -2529,7 +2529,7 @@
           <a:p>
             <a:fld id="{6D55FDF3-8BB2-6349-A5FA-057F3D78953D}" type="datetime1">
               <a:rPr lang="en-US" smtClean="0"/>
-              <a:t>4/28/21</a:t>
+              <a:t>6/15/21</a:t>
             </a:fld>
             <a:endParaRPr lang="en-US"/>
           </a:p>
@@ -2843,7 +2843,7 @@
           <a:p>
             <a:fld id="{EEDFACC0-3228-BA4B-942E-CEF38B0101FD}" type="datetime1">
               <a:rPr lang="en-US" smtClean="0"/>
-              <a:t>4/28/21</a:t>
+              <a:t>6/15/21</a:t>
             </a:fld>
             <a:endParaRPr lang="en-US"/>
           </a:p>
@@ -3134,7 +3134,7 @@
           <a:p>
             <a:fld id="{07EEEDBE-E24C-D140-B419-6D8D592D0F1C}" type="datetime1">
               <a:rPr lang="en-US" smtClean="0"/>
-              <a:t>4/28/21</a:t>
+              <a:t>6/15/21</a:t>
             </a:fld>
             <a:endParaRPr lang="en-US"/>
           </a:p>
@@ -3378,7 +3378,7 @@
           <a:p>
             <a:fld id="{E05781A2-A5EF-C54C-A3EF-F62483D37EDC}" type="datetime1">
               <a:rPr lang="en-US" smtClean="0"/>
-              <a:t>4/28/21</a:t>
+              <a:t>6/15/21</a:t>
             </a:fld>
             <a:endParaRPr lang="en-US"/>
           </a:p>
@@ -4891,160 +4891,6 @@
       </p:cxnSp>
       <p:sp>
         <p:nvSpPr>
-          <p:cNvPr id="102" name="TextBox 101">
-            <a:extLst>
-              <a:ext uri="{FF2B5EF4-FFF2-40B4-BE49-F238E27FC236}">
-                <a16:creationId xmlns:a16="http://schemas.microsoft.com/office/drawing/2014/main" id="{B08A209E-6175-014E-88D7-C5097629323E}"/>
-              </a:ext>
-            </a:extLst>
-          </p:cNvPr>
-          <p:cNvSpPr txBox="1"/>
-          <p:nvPr/>
-        </p:nvSpPr>
-        <p:spPr>
-          <a:xfrm>
-            <a:off x="10051700" y="3059137"/>
-            <a:ext cx="1165897" cy="369332"/>
-          </a:xfrm>
-          <a:prstGeom prst="rect">
-            <a:avLst/>
-          </a:prstGeom>
-          <a:noFill/>
-        </p:spPr>
-        <p:txBody>
-          <a:bodyPr wrap="none" rtlCol="0">
-            <a:spAutoFit/>
-          </a:bodyPr>
-          <a:lstStyle/>
-          <a:p>
-            <a:pPr marL="0" marR="0" lvl="0" indent="0" algn="l" defTabSz="914400" rtl="0" eaLnBrk="1" fontAlgn="auto" latinLnBrk="0" hangingPunct="1">
-              <a:lnSpc>
-                <a:spcPct val="100000"/>
-              </a:lnSpc>
-              <a:spcBef>
-                <a:spcPts val="0"/>
-              </a:spcBef>
-              <a:spcAft>
-                <a:spcPts val="0"/>
-              </a:spcAft>
-              <a:buClrTx/>
-              <a:buSzTx/>
-              <a:buFontTx/>
-              <a:buNone/>
-              <a:tabLst/>
-              <a:defRPr/>
-            </a:pPr>
-            <a:r>
-              <a:rPr kumimoji="0" lang="en-US" sz="1800" b="0" i="0" u="none" strike="noStrike" kern="1200" cap="none" spc="0" normalizeH="0" baseline="0" noProof="0" dirty="0">
-                <a:ln>
-                  <a:noFill/>
-                </a:ln>
-                <a:solidFill>
-                  <a:prstClr val="black"/>
-                </a:solidFill>
-                <a:effectLst/>
-                <a:uLnTx/>
-                <a:uFillTx/>
-                <a:latin typeface="Calibri" panose="020F0502020204030204"/>
-                <a:ea typeface="+mn-ea"/>
-                <a:cs typeface="+mn-cs"/>
-              </a:rPr>
-              <a:t>L</a:t>
-            </a:r>
-            <a:r>
-              <a:rPr kumimoji="0" lang="en-US" sz="1800" b="0" i="0" u="none" strike="noStrike" kern="1200" cap="none" spc="0" normalizeH="0" baseline="0" noProof="0" dirty="0" err="1">
-                <a:ln>
-                  <a:noFill/>
-                </a:ln>
-                <a:solidFill>
-                  <a:prstClr val="black"/>
-                </a:solidFill>
-                <a:effectLst/>
-                <a:uLnTx/>
-                <a:uFillTx/>
-                <a:latin typeface="Calibri" panose="020F0502020204030204"/>
-                <a:ea typeface="+mn-ea"/>
-                <a:cs typeface="+mn-cs"/>
-              </a:rPr>
-              <a:t>atency</a:t>
-            </a:r>
-            <a:r>
-              <a:rPr kumimoji="0" lang="en-US" sz="1800" b="0" i="0" u="none" strike="noStrike" kern="1200" cap="none" spc="0" normalizeH="0" baseline="0" noProof="0" dirty="0">
-                <a:ln>
-                  <a:noFill/>
-                </a:ln>
-                <a:solidFill>
-                  <a:prstClr val="black"/>
-                </a:solidFill>
-                <a:effectLst/>
-                <a:uLnTx/>
-                <a:uFillTx/>
-                <a:latin typeface="Calibri" panose="020F0502020204030204"/>
-                <a:ea typeface="+mn-ea"/>
-                <a:cs typeface="+mn-cs"/>
-              </a:rPr>
-              <a:t> </a:t>
-            </a:r>
-            <a:r>
-              <a:rPr kumimoji="0" lang="en-US" sz="1800" b="1" i="0" u="none" strike="noStrike" kern="1200" cap="none" spc="0" normalizeH="0" baseline="0" noProof="0" dirty="0">
-                <a:ln>
-                  <a:noFill/>
-                </a:ln>
-                <a:solidFill>
-                  <a:srgbClr val="70AD47">
-                    <a:lumMod val="50000"/>
-                  </a:srgbClr>
-                </a:solidFill>
-                <a:effectLst/>
-                <a:uLnTx/>
-                <a:uFillTx/>
-                <a:latin typeface="Calibri" panose="020F0502020204030204"/>
-                <a:ea typeface="+mn-ea"/>
-                <a:cs typeface="+mn-cs"/>
-              </a:rPr>
-              <a:t>↓</a:t>
-            </a:r>
-          </a:p>
-        </p:txBody>
-      </p:sp>
-      <p:pic>
-        <p:nvPicPr>
-          <p:cNvPr id="103" name="Graphic 102" descr="Checkbox Checked">
-            <a:extLst>
-              <a:ext uri="{FF2B5EF4-FFF2-40B4-BE49-F238E27FC236}">
-                <a16:creationId xmlns:a16="http://schemas.microsoft.com/office/drawing/2014/main" id="{A3DC6575-C87E-854A-A40A-87D28A74C2FC}"/>
-              </a:ext>
-            </a:extLst>
-          </p:cNvPr>
-          <p:cNvPicPr>
-            <a:picLocks noChangeAspect="1"/>
-          </p:cNvPicPr>
-          <p:nvPr/>
-        </p:nvPicPr>
-        <p:blipFill>
-          <a:blip r:embed="rId7">
-            <a:extLst>
-              <a:ext uri="{96DAC541-7B7A-43D3-8B79-37D633B846F1}">
-                <asvg:svgBlip xmlns:asvg="http://schemas.microsoft.com/office/drawing/2016/SVG/main" r:embed="rId8"/>
-              </a:ext>
-            </a:extLst>
-          </a:blip>
-          <a:stretch>
-            <a:fillRect/>
-          </a:stretch>
-        </p:blipFill>
-        <p:spPr>
-          <a:xfrm>
-            <a:off x="9631084" y="2976899"/>
-            <a:ext cx="533808" cy="533808"/>
-          </a:xfrm>
-          <a:prstGeom prst="rect">
-            <a:avLst/>
-          </a:prstGeom>
-        </p:spPr>
-      </p:pic>
-      <p:sp>
-        <p:nvSpPr>
           <p:cNvPr id="104" name="TextBox 103">
             <a:extLst>
               <a:ext uri="{FF2B5EF4-FFF2-40B4-BE49-F238E27FC236}">
@@ -5165,126 +5011,6 @@
       </p:pic>
       <p:sp>
         <p:nvSpPr>
-          <p:cNvPr id="106" name="TextBox 105">
-            <a:extLst>
-              <a:ext uri="{FF2B5EF4-FFF2-40B4-BE49-F238E27FC236}">
-                <a16:creationId xmlns:a16="http://schemas.microsoft.com/office/drawing/2014/main" id="{6A911BFC-D78F-DA48-B06C-DB8A27697834}"/>
-              </a:ext>
-            </a:extLst>
-          </p:cNvPr>
-          <p:cNvSpPr txBox="1"/>
-          <p:nvPr/>
-        </p:nvSpPr>
-        <p:spPr>
-          <a:xfrm>
-            <a:off x="10052163" y="3521477"/>
-            <a:ext cx="1343381" cy="369332"/>
-          </a:xfrm>
-          <a:prstGeom prst="rect">
-            <a:avLst/>
-          </a:prstGeom>
-          <a:noFill/>
-        </p:spPr>
-        <p:txBody>
-          <a:bodyPr wrap="none" rtlCol="0">
-            <a:spAutoFit/>
-          </a:bodyPr>
-          <a:lstStyle/>
-          <a:p>
-            <a:pPr marL="0" marR="0" lvl="0" indent="0" algn="l" defTabSz="914400" rtl="0" eaLnBrk="1" fontAlgn="auto" latinLnBrk="0" hangingPunct="1">
-              <a:lnSpc>
-                <a:spcPct val="100000"/>
-              </a:lnSpc>
-              <a:spcBef>
-                <a:spcPts val="0"/>
-              </a:spcBef>
-              <a:spcAft>
-                <a:spcPts val="0"/>
-              </a:spcAft>
-              <a:buClrTx/>
-              <a:buSzTx/>
-              <a:buFontTx/>
-              <a:buNone/>
-              <a:tabLst/>
-              <a:defRPr/>
-            </a:pPr>
-            <a:r>
-              <a:rPr kumimoji="0" lang="en-US" sz="1800" b="0" i="0" u="none" strike="noStrike" kern="1200" cap="none" spc="0" normalizeH="0" baseline="0" noProof="0" dirty="0">
-                <a:ln>
-                  <a:noFill/>
-                </a:ln>
-                <a:solidFill>
-                  <a:prstClr val="black"/>
-                </a:solidFill>
-                <a:effectLst/>
-                <a:uLnTx/>
-                <a:uFillTx/>
-                <a:latin typeface="Calibri" panose="020F0502020204030204"/>
-                <a:ea typeface="+mn-ea"/>
-                <a:cs typeface="+mn-cs"/>
-              </a:rPr>
-              <a:t>Error rate </a:t>
-            </a:r>
-            <a:r>
-              <a:rPr kumimoji="0" lang="en-US" sz="1800" b="1" i="0" u="none" strike="noStrike" kern="1200" cap="none" spc="0" normalizeH="0" baseline="0" noProof="0" dirty="0">
-                <a:ln>
-                  <a:noFill/>
-                </a:ln>
-                <a:solidFill>
-                  <a:srgbClr val="70AD47">
-                    <a:lumMod val="50000"/>
-                  </a:srgbClr>
-                </a:solidFill>
-                <a:effectLst/>
-                <a:uLnTx/>
-                <a:uFillTx/>
-                <a:latin typeface="Calibri" panose="020F0502020204030204"/>
-                <a:ea typeface="+mn-ea"/>
-                <a:cs typeface="+mn-cs"/>
-              </a:rPr>
-              <a:t>↓</a:t>
-            </a:r>
-          </a:p>
-        </p:txBody>
-      </p:sp>
-      <p:pic>
-        <p:nvPicPr>
-          <p:cNvPr id="107" name="Graphic 106" descr="Checkbox Checked">
-            <a:extLst>
-              <a:ext uri="{FF2B5EF4-FFF2-40B4-BE49-F238E27FC236}">
-                <a16:creationId xmlns:a16="http://schemas.microsoft.com/office/drawing/2014/main" id="{41D99975-CD56-2146-9B06-FFD75711CB8F}"/>
-              </a:ext>
-            </a:extLst>
-          </p:cNvPr>
-          <p:cNvPicPr>
-            <a:picLocks noChangeAspect="1"/>
-          </p:cNvPicPr>
-          <p:nvPr/>
-        </p:nvPicPr>
-        <p:blipFill>
-          <a:blip r:embed="rId7">
-            <a:extLst>
-              <a:ext uri="{96DAC541-7B7A-43D3-8B79-37D633B846F1}">
-                <asvg:svgBlip xmlns:asvg="http://schemas.microsoft.com/office/drawing/2016/SVG/main" r:embed="rId8"/>
-              </a:ext>
-            </a:extLst>
-          </a:blip>
-          <a:stretch>
-            <a:fillRect/>
-          </a:stretch>
-        </p:blipFill>
-        <p:spPr>
-          <a:xfrm>
-            <a:off x="9631547" y="3439239"/>
-            <a:ext cx="533808" cy="533808"/>
-          </a:xfrm>
-          <a:prstGeom prst="rect">
-            <a:avLst/>
-          </a:prstGeom>
-        </p:spPr>
-      </p:pic>
-      <p:sp>
-        <p:nvSpPr>
           <p:cNvPr id="108" name="Rounded Rectangle 107">
             <a:extLst>
               <a:ext uri="{FF2B5EF4-FFF2-40B4-BE49-F238E27FC236}">
@@ -6936,71 +6662,6 @@
                 <a:cs typeface="+mn-cs"/>
               </a:rPr>
               <a:t>Reward</a:t>
-            </a:r>
-          </a:p>
-        </p:txBody>
-      </p:sp>
-      <p:sp>
-        <p:nvSpPr>
-          <p:cNvPr id="57" name="TextBox 56">
-            <a:extLst>
-              <a:ext uri="{FF2B5EF4-FFF2-40B4-BE49-F238E27FC236}">
-                <a16:creationId xmlns:a16="http://schemas.microsoft.com/office/drawing/2014/main" id="{E186B279-A9F3-BA43-BCB0-B2300A5DF5EF}"/>
-              </a:ext>
-            </a:extLst>
-          </p:cNvPr>
-          <p:cNvSpPr txBox="1"/>
-          <p:nvPr/>
-        </p:nvSpPr>
-        <p:spPr>
-          <a:xfrm>
-            <a:off x="9670918" y="2700845"/>
-            <a:ext cx="1184427" cy="369332"/>
-          </a:xfrm>
-          <a:prstGeom prst="rect">
-            <a:avLst/>
-          </a:prstGeom>
-          <a:noFill/>
-        </p:spPr>
-        <p:txBody>
-          <a:bodyPr wrap="none" rtlCol="0">
-            <a:spAutoFit/>
-          </a:bodyPr>
-          <a:lstStyle/>
-          <a:p>
-            <a:pPr marL="0" marR="0" lvl="0" indent="0" algn="l" defTabSz="914400" rtl="0" eaLnBrk="1" fontAlgn="auto" latinLnBrk="0" hangingPunct="1">
-              <a:lnSpc>
-                <a:spcPct val="100000"/>
-              </a:lnSpc>
-              <a:spcBef>
-                <a:spcPts val="0"/>
-              </a:spcBef>
-              <a:spcAft>
-                <a:spcPts val="0"/>
-              </a:spcAft>
-              <a:buClrTx/>
-              <a:buSzTx/>
-              <a:buFontTx/>
-              <a:buNone/>
-              <a:tabLst/>
-              <a:defRPr/>
-            </a:pPr>
-            <a:r>
-              <a:rPr kumimoji="0" lang="en-US" sz="1800" b="1" i="0" u="none" strike="noStrike" kern="1200" cap="none" spc="0" normalizeH="0" baseline="0" noProof="0" dirty="0">
-                <a:ln>
-                  <a:noFill/>
-                </a:ln>
-                <a:solidFill>
-                  <a:srgbClr val="C00000"/>
-                </a:solidFill>
-                <a:effectLst/>
-                <a:uLnTx/>
-                <a:uFillTx/>
-                <a:latin typeface="Calibri" panose="020F0502020204030204"/>
-                <a:ea typeface="+mn-ea"/>
-                <a:cs typeface="+mn-cs"/>
-              </a:rPr>
-              <a:t>Objectives</a:t>
             </a:r>
           </a:p>
         </p:txBody>

</xml_diff>